<commit_message>
Fixed proposed changes after feedback
</commit_message>
<xml_diff>
--- a/Figures/PowerExample.pptx
+++ b/Figures/PowerExample.pptx
@@ -288,7 +288,7 @@
           <a:p>
             <a:fld id="{47B9A199-D001-9B4E-B758-14EC809AFE55}" type="datetimeFigureOut">
               <a:rPr lang="da-DK" smtClean="0"/>
-              <a:t>20/07/14</a:t>
+              <a:t>21/07/14</a:t>
             </a:fld>
             <a:endParaRPr lang="en-GB"/>
           </a:p>
@@ -458,7 +458,7 @@
           <a:p>
             <a:fld id="{47B9A199-D001-9B4E-B758-14EC809AFE55}" type="datetimeFigureOut">
               <a:rPr lang="da-DK" smtClean="0"/>
-              <a:t>20/07/14</a:t>
+              <a:t>21/07/14</a:t>
             </a:fld>
             <a:endParaRPr lang="en-GB"/>
           </a:p>
@@ -638,7 +638,7 @@
           <a:p>
             <a:fld id="{47B9A199-D001-9B4E-B758-14EC809AFE55}" type="datetimeFigureOut">
               <a:rPr lang="da-DK" smtClean="0"/>
-              <a:t>20/07/14</a:t>
+              <a:t>21/07/14</a:t>
             </a:fld>
             <a:endParaRPr lang="en-GB"/>
           </a:p>
@@ -808,7 +808,7 @@
           <a:p>
             <a:fld id="{47B9A199-D001-9B4E-B758-14EC809AFE55}" type="datetimeFigureOut">
               <a:rPr lang="da-DK" smtClean="0"/>
-              <a:t>20/07/14</a:t>
+              <a:t>21/07/14</a:t>
             </a:fld>
             <a:endParaRPr lang="en-GB"/>
           </a:p>
@@ -1054,7 +1054,7 @@
           <a:p>
             <a:fld id="{47B9A199-D001-9B4E-B758-14EC809AFE55}" type="datetimeFigureOut">
               <a:rPr lang="da-DK" smtClean="0"/>
-              <a:t>20/07/14</a:t>
+              <a:t>21/07/14</a:t>
             </a:fld>
             <a:endParaRPr lang="en-GB"/>
           </a:p>
@@ -1342,7 +1342,7 @@
           <a:p>
             <a:fld id="{47B9A199-D001-9B4E-B758-14EC809AFE55}" type="datetimeFigureOut">
               <a:rPr lang="da-DK" smtClean="0"/>
-              <a:t>20/07/14</a:t>
+              <a:t>21/07/14</a:t>
             </a:fld>
             <a:endParaRPr lang="en-GB"/>
           </a:p>
@@ -1764,7 +1764,7 @@
           <a:p>
             <a:fld id="{47B9A199-D001-9B4E-B758-14EC809AFE55}" type="datetimeFigureOut">
               <a:rPr lang="da-DK" smtClean="0"/>
-              <a:t>20/07/14</a:t>
+              <a:t>21/07/14</a:t>
             </a:fld>
             <a:endParaRPr lang="en-GB"/>
           </a:p>
@@ -1882,7 +1882,7 @@
           <a:p>
             <a:fld id="{47B9A199-D001-9B4E-B758-14EC809AFE55}" type="datetimeFigureOut">
               <a:rPr lang="da-DK" smtClean="0"/>
-              <a:t>20/07/14</a:t>
+              <a:t>21/07/14</a:t>
             </a:fld>
             <a:endParaRPr lang="en-GB"/>
           </a:p>
@@ -1977,7 +1977,7 @@
           <a:p>
             <a:fld id="{47B9A199-D001-9B4E-B758-14EC809AFE55}" type="datetimeFigureOut">
               <a:rPr lang="da-DK" smtClean="0"/>
-              <a:t>20/07/14</a:t>
+              <a:t>21/07/14</a:t>
             </a:fld>
             <a:endParaRPr lang="en-GB"/>
           </a:p>
@@ -2254,7 +2254,7 @@
           <a:p>
             <a:fld id="{47B9A199-D001-9B4E-B758-14EC809AFE55}" type="datetimeFigureOut">
               <a:rPr lang="da-DK" smtClean="0"/>
-              <a:t>20/07/14</a:t>
+              <a:t>21/07/14</a:t>
             </a:fld>
             <a:endParaRPr lang="en-GB"/>
           </a:p>
@@ -2507,7 +2507,7 @@
           <a:p>
             <a:fld id="{47B9A199-D001-9B4E-B758-14EC809AFE55}" type="datetimeFigureOut">
               <a:rPr lang="da-DK" smtClean="0"/>
-              <a:t>20/07/14</a:t>
+              <a:t>21/07/14</a:t>
             </a:fld>
             <a:endParaRPr lang="en-GB"/>
           </a:p>
@@ -2720,7 +2720,7 @@
           <a:p>
             <a:fld id="{47B9A199-D001-9B4E-B758-14EC809AFE55}" type="datetimeFigureOut">
               <a:rPr lang="da-DK" smtClean="0"/>
-              <a:t>20/07/14</a:t>
+              <a:t>21/07/14</a:t>
             </a:fld>
             <a:endParaRPr lang="en-GB"/>
           </a:p>
@@ -3103,8 +3103,8 @@
         </p:nvSpPr>
         <p:spPr>
           <a:xfrm>
-            <a:off x="809626" y="2142619"/>
-            <a:ext cx="7191374" cy="3046988"/>
+            <a:off x="365124" y="1840994"/>
+            <a:ext cx="8683625" cy="3046988"/>
           </a:xfrm>
           <a:prstGeom prst="rect">
             <a:avLst/>
@@ -3118,29 +3118,60 @@
           <a:lstStyle/>
           <a:p>
             <a:r>
+              <a:rPr lang="en-US" sz="2400" dirty="0" smtClean="0">
+                <a:solidFill>
+                  <a:srgbClr val="C0504D"/>
+                </a:solidFill>
+                <a:latin typeface="Lucida Console"/>
+                <a:cs typeface="Lucida Console"/>
+              </a:rPr>
+              <a:t>power</a:t>
+            </a:r>
+            <a:r>
+              <a:rPr lang="en-US" sz="2400" dirty="0" smtClean="0">
+                <a:latin typeface="Lucida Console"/>
+                <a:cs typeface="Lucida Console"/>
+              </a:rPr>
+              <a:t> </a:t>
+            </a:r>
+            <a:r>
               <a:rPr lang="en-US" sz="2400" dirty="0">
-                <a:solidFill>
-                  <a:schemeClr val="accent2"/>
-                </a:solidFill>
-                <a:latin typeface="Lucida Console"/>
-                <a:cs typeface="Lucida Console"/>
-              </a:rPr>
-              <a:t>square</a:t>
+                <a:latin typeface="Lucida Console"/>
+                <a:cs typeface="Lucida Console"/>
+              </a:rPr>
+              <a:t>: </a:t>
+            </a:r>
+            <a:r>
+              <a:rPr lang="en-US" sz="2400" dirty="0" err="1">
+                <a:solidFill>
+                  <a:srgbClr val="8EB4E3"/>
+                </a:solidFill>
+                <a:latin typeface="Lucida Console"/>
+                <a:cs typeface="Lucida Console"/>
+              </a:rPr>
+              <a:t>Int</a:t>
             </a:r>
             <a:r>
               <a:rPr lang="en-US" sz="2400" dirty="0">
-                <a:latin typeface="Lucida Console"/>
-                <a:cs typeface="Lucida Console"/>
-              </a:rPr>
-              <a:t> : </a:t>
+                <a:solidFill>
+                  <a:srgbClr val="8EB4E3"/>
+                </a:solidFill>
+                <a:latin typeface="Lucida Console"/>
+                <a:cs typeface="Lucida Console"/>
+              </a:rPr>
+              <a:t> </a:t>
+            </a:r>
+            <a:r>
+              <a:rPr lang="en-US" sz="2400" dirty="0">
+                <a:latin typeface="Lucida Console"/>
+                <a:cs typeface="Lucida Console"/>
+              </a:rPr>
+              <a:t>-&gt; </a:t>
             </a:r>
             <a:r>
               <a:rPr lang="en-US" sz="2400" dirty="0" err="1">
                 <a:solidFill>
-                  <a:schemeClr val="tx2">
-                    <a:lumMod val="40000"/>
-                    <a:lumOff val="60000"/>
-                  </a:schemeClr>
+                  <a:srgbClr val="8EB4E3"/>
                 </a:solidFill>
                 <a:latin typeface="Lucida Console"/>
                 <a:cs typeface="Lucida Console"/>
@@ -3150,10 +3181,7 @@
             <a:r>
               <a:rPr lang="en-US" sz="2400" dirty="0">
                 <a:solidFill>
-                  <a:schemeClr val="tx2">
-                    <a:lumMod val="40000"/>
-                    <a:lumOff val="60000"/>
-                  </a:schemeClr>
+                  <a:srgbClr val="8EB4E3"/>
                 </a:solidFill>
                 <a:latin typeface="Lucida Console"/>
                 <a:cs typeface="Lucida Console"/>
@@ -3187,14 +3215,24 @@
           </a:p>
           <a:p>
             <a:r>
+              <a:rPr lang="en-US" sz="2400" dirty="0">
+                <a:solidFill>
+                  <a:srgbClr val="C0504D"/>
+                </a:solidFill>
+                <a:latin typeface="Lucida Console"/>
+                <a:cs typeface="Lucida Console"/>
+              </a:rPr>
+              <a:t>p</a:t>
+            </a:r>
+            <a:r>
               <a:rPr lang="en-US" sz="2400" dirty="0" smtClean="0">
                 <a:solidFill>
-                  <a:schemeClr val="accent2"/>
-                </a:solidFill>
-                <a:latin typeface="Lucida Console"/>
-                <a:cs typeface="Lucida Console"/>
-              </a:rPr>
-              <a:t>square</a:t>
+                  <a:srgbClr val="C0504D"/>
+                </a:solidFill>
+                <a:latin typeface="Lucida Console"/>
+                <a:cs typeface="Lucida Console"/>
+              </a:rPr>
+              <a:t>ower</a:t>
             </a:r>
             <a:r>
               <a:rPr lang="en-US" sz="2400" dirty="0" smtClean="0">
@@ -3204,200 +3242,28 @@
               <a:t> </a:t>
             </a:r>
             <a:r>
+              <a:rPr lang="en-US" sz="2400" dirty="0" smtClean="0">
+                <a:solidFill>
+                  <a:srgbClr val="E6B9B8"/>
+                </a:solidFill>
+                <a:latin typeface="Lucida Console"/>
+                <a:cs typeface="Lucida Console"/>
+              </a:rPr>
+              <a:t>n x</a:t>
+            </a:r>
+            <a:r>
+              <a:rPr lang="en-US" sz="2400" dirty="0" smtClean="0">
+                <a:latin typeface="Lucida Console"/>
+                <a:cs typeface="Lucida Console"/>
+              </a:rPr>
+              <a:t> </a:t>
+            </a:r>
+            <a:r>
               <a:rPr lang="en-US" sz="2400" dirty="0">
-                <a:solidFill>
-                  <a:schemeClr val="accent2">
-                    <a:lumMod val="40000"/>
-                    <a:lumOff val="60000"/>
-                  </a:schemeClr>
-                </a:solidFill>
-                <a:latin typeface="Lucida Console"/>
-                <a:cs typeface="Lucida Console"/>
-              </a:rPr>
-              <a:t>x</a:t>
-            </a:r>
-            <a:r>
-              <a:rPr lang="en-US" sz="2400" dirty="0">
-                <a:latin typeface="Lucida Console"/>
-                <a:cs typeface="Lucida Console"/>
-              </a:rPr>
-              <a:t> = </a:t>
-            </a:r>
-            <a:r>
-              <a:rPr lang="en-US" sz="2400" dirty="0">
-                <a:solidFill>
-                  <a:srgbClr val="E6B9B8"/>
-                </a:solidFill>
-                <a:latin typeface="Lucida Console"/>
-                <a:cs typeface="Lucida Console"/>
-              </a:rPr>
-              <a:t>x</a:t>
-            </a:r>
-            <a:r>
-              <a:rPr lang="en-US" sz="2400" dirty="0">
-                <a:latin typeface="Lucida Console"/>
-                <a:cs typeface="Lucida Console"/>
-              </a:rPr>
-              <a:t> * </a:t>
-            </a:r>
-            <a:r>
-              <a:rPr lang="en-US" sz="2400" dirty="0">
-                <a:solidFill>
-                  <a:srgbClr val="E6B9B8"/>
-                </a:solidFill>
-                <a:latin typeface="Lucida Console"/>
-                <a:cs typeface="Lucida Console"/>
-              </a:rPr>
-              <a:t>x</a:t>
-            </a:r>
-          </a:p>
-          <a:p>
-            <a:endParaRPr lang="en-US" sz="2400" dirty="0">
-              <a:latin typeface="Lucida Console"/>
-              <a:cs typeface="Lucida Console"/>
-            </a:endParaRPr>
-          </a:p>
-          <a:p>
-            <a:r>
-              <a:rPr lang="en-US" sz="2400" dirty="0">
-                <a:solidFill>
-                  <a:srgbClr val="C0504D"/>
-                </a:solidFill>
-                <a:latin typeface="Lucida Console"/>
-                <a:cs typeface="Lucida Console"/>
-              </a:rPr>
-              <a:t>power</a:t>
-            </a:r>
-            <a:r>
-              <a:rPr lang="en-US" sz="2400" dirty="0">
-                <a:latin typeface="Lucida Console"/>
-                <a:cs typeface="Lucida Console"/>
-              </a:rPr>
-              <a:t> : </a:t>
-            </a:r>
-            <a:r>
-              <a:rPr lang="en-US" sz="2400" dirty="0" err="1">
-                <a:solidFill>
-                  <a:srgbClr val="8EB4E3"/>
-                </a:solidFill>
-                <a:latin typeface="Lucida Console"/>
-                <a:cs typeface="Lucida Console"/>
-              </a:rPr>
-              <a:t>Int</a:t>
-            </a:r>
-            <a:r>
-              <a:rPr lang="en-US" sz="2400" dirty="0">
-                <a:solidFill>
-                  <a:srgbClr val="8EB4E3"/>
-                </a:solidFill>
-                <a:latin typeface="Lucida Console"/>
-                <a:cs typeface="Lucida Console"/>
-              </a:rPr>
-              <a:t> </a:t>
-            </a:r>
-            <a:r>
-              <a:rPr lang="en-US" sz="2400" dirty="0">
-                <a:latin typeface="Lucida Console"/>
-                <a:cs typeface="Lucida Console"/>
-              </a:rPr>
-              <a:t>-&gt; </a:t>
-            </a:r>
-            <a:r>
-              <a:rPr lang="en-US" sz="2400" dirty="0" err="1">
-                <a:solidFill>
-                  <a:srgbClr val="8EB4E3"/>
-                </a:solidFill>
-                <a:latin typeface="Lucida Console"/>
-                <a:cs typeface="Lucida Console"/>
-              </a:rPr>
-              <a:t>Int</a:t>
-            </a:r>
-            <a:r>
-              <a:rPr lang="en-US" sz="2400" dirty="0">
-                <a:solidFill>
-                  <a:srgbClr val="8EB4E3"/>
-                </a:solidFill>
-                <a:latin typeface="Lucida Console"/>
-                <a:cs typeface="Lucida Console"/>
-              </a:rPr>
-              <a:t> </a:t>
-            </a:r>
-            <a:r>
-              <a:rPr lang="en-US" sz="2400" dirty="0">
-                <a:latin typeface="Lucida Console"/>
-                <a:cs typeface="Lucida Console"/>
-              </a:rPr>
-              <a:t>-&gt; </a:t>
-            </a:r>
-            <a:r>
-              <a:rPr lang="en-US" sz="2400" dirty="0" err="1">
-                <a:solidFill>
-                  <a:srgbClr val="8EB4E3"/>
-                </a:solidFill>
-                <a:latin typeface="Lucida Console"/>
-                <a:cs typeface="Lucida Console"/>
-              </a:rPr>
-              <a:t>Int</a:t>
-            </a:r>
-            <a:endParaRPr lang="en-US" sz="2400" dirty="0">
-              <a:solidFill>
-                <a:srgbClr val="8EB4E3"/>
-              </a:solidFill>
-              <a:latin typeface="Lucida Console"/>
-              <a:cs typeface="Lucida Console"/>
-            </a:endParaRPr>
-          </a:p>
-          <a:p>
-            <a:r>
-              <a:rPr lang="en-US" sz="2400" dirty="0" smtClean="0">
-                <a:solidFill>
-                  <a:srgbClr val="C0504D"/>
-                </a:solidFill>
-                <a:latin typeface="Lucida Console"/>
-                <a:cs typeface="Lucida Console"/>
-              </a:rPr>
-              <a:t>power</a:t>
-            </a:r>
-            <a:r>
-              <a:rPr lang="en-US" sz="2400" dirty="0" smtClean="0">
-                <a:latin typeface="Lucida Console"/>
-                <a:cs typeface="Lucida Console"/>
-              </a:rPr>
-              <a:t> </a:t>
-            </a:r>
-            <a:r>
-              <a:rPr lang="en-US" sz="2400" dirty="0">
-                <a:solidFill>
-                  <a:srgbClr val="E6B9B8"/>
-                </a:solidFill>
-                <a:latin typeface="Lucida Console"/>
-                <a:cs typeface="Lucida Console"/>
-              </a:rPr>
-              <a:t>x</a:t>
-            </a:r>
-            <a:r>
-              <a:rPr lang="en-US" sz="2400" dirty="0">
-                <a:latin typeface="Lucida Console"/>
-                <a:cs typeface="Lucida Console"/>
-              </a:rPr>
-              <a:t> </a:t>
-            </a:r>
-            <a:r>
-              <a:rPr lang="en-US" sz="2400" dirty="0">
-                <a:solidFill>
-                  <a:srgbClr val="E6B9B8"/>
-                </a:solidFill>
-                <a:latin typeface="Lucida Console"/>
-                <a:cs typeface="Lucida Console"/>
-              </a:rPr>
-              <a:t>n</a:t>
-            </a:r>
-            <a:r>
-              <a:rPr lang="en-US" sz="2400" dirty="0">
-                <a:latin typeface="Lucida Console"/>
-                <a:cs typeface="Lucida Console"/>
-              </a:rPr>
-              <a:t> = </a:t>
+                <a:latin typeface="Lucida Console"/>
+                <a:cs typeface="Lucida Console"/>
+              </a:rPr>
+              <a:t>= </a:t>
             </a:r>
             <a:endParaRPr lang="en-US" sz="2400" dirty="0" smtClean="0">
               <a:latin typeface="Lucida Console"/>
@@ -3406,10 +3272,100 @@
           </a:p>
           <a:p>
             <a:r>
+              <a:rPr lang="en-US" sz="2400" dirty="0" smtClean="0">
+                <a:latin typeface="Lucida Console"/>
+                <a:cs typeface="Lucida Console"/>
+              </a:rPr>
+              <a:t>	</a:t>
+            </a:r>
+            <a:r>
+              <a:rPr lang="en-US" sz="2400" b="1" dirty="0" smtClean="0">
+                <a:latin typeface="Lucida Console"/>
+                <a:cs typeface="Lucida Console"/>
+              </a:rPr>
+              <a:t>if </a:t>
+            </a:r>
+            <a:r>
+              <a:rPr lang="en-US" sz="2400" dirty="0" smtClean="0">
+                <a:solidFill>
+                  <a:srgbClr val="E6B9B8"/>
+                </a:solidFill>
+                <a:latin typeface="Lucida Console"/>
+                <a:cs typeface="Lucida Console"/>
+              </a:rPr>
+              <a:t>n</a:t>
+            </a:r>
+            <a:r>
+              <a:rPr lang="en-US" sz="2400" dirty="0" smtClean="0">
+                <a:latin typeface="Lucida Console"/>
+                <a:cs typeface="Lucida Console"/>
+              </a:rPr>
+              <a:t> =</a:t>
+            </a:r>
+            <a:r>
+              <a:rPr lang="en-US" sz="2400" dirty="0">
+                <a:latin typeface="Lucida Console"/>
+                <a:cs typeface="Lucida Console"/>
+              </a:rPr>
+              <a:t>= </a:t>
+            </a:r>
+            <a:r>
+              <a:rPr lang="en-US" sz="2400" dirty="0" smtClean="0">
+                <a:solidFill>
+                  <a:srgbClr val="CCC1DA"/>
+                </a:solidFill>
+                <a:latin typeface="Lucida Console"/>
+                <a:cs typeface="Lucida Console"/>
+              </a:rPr>
+              <a:t>0</a:t>
+            </a:r>
+          </a:p>
+          <a:p>
+            <a:r>
+              <a:rPr lang="en-US" sz="2400" dirty="0">
+                <a:solidFill>
+                  <a:srgbClr val="CCC1DA"/>
+                </a:solidFill>
+                <a:latin typeface="Lucida Console"/>
+                <a:cs typeface="Lucida Console"/>
+              </a:rPr>
+              <a:t>	</a:t>
+            </a:r>
+            <a:r>
               <a:rPr lang="en-US" sz="2400" b="1" dirty="0">
                 <a:latin typeface="Lucida Console"/>
                 <a:cs typeface="Lucida Console"/>
               </a:rPr>
+              <a:t>then</a:t>
+            </a:r>
+            <a:r>
+              <a:rPr lang="en-US" sz="2400" dirty="0">
+                <a:latin typeface="Lucida Console"/>
+                <a:cs typeface="Lucida Console"/>
+              </a:rPr>
+              <a:t> </a:t>
+            </a:r>
+            <a:r>
+              <a:rPr lang="en-US" sz="2400" dirty="0">
+                <a:solidFill>
+                  <a:srgbClr val="CCC1DA"/>
+                </a:solidFill>
+                <a:latin typeface="Lucida Console"/>
+                <a:cs typeface="Lucida Console"/>
+              </a:rPr>
+              <a:t>1</a:t>
+            </a:r>
+            <a:endParaRPr lang="en-US" sz="2400" dirty="0" smtClean="0">
+              <a:latin typeface="Lucida Console"/>
+              <a:cs typeface="Lucida Console"/>
+            </a:endParaRPr>
+          </a:p>
+          <a:p>
+            <a:r>
+              <a:rPr lang="en-US" sz="2400" b="1" dirty="0">
+                <a:latin typeface="Lucida Console"/>
+                <a:cs typeface="Lucida Console"/>
+              </a:rPr>
               <a:t>	</a:t>
             </a:r>
             <a:r>
@@ -3417,7 +3373,7 @@
                 <a:latin typeface="Lucida Console"/>
                 <a:cs typeface="Lucida Console"/>
               </a:rPr>
-              <a:t>if</a:t>
+              <a:t>else if</a:t>
             </a:r>
             <a:r>
               <a:rPr lang="en-US" sz="2400" dirty="0" smtClean="0">
@@ -3504,6 +3460,16 @@
             </a:r>
             <a:r>
               <a:rPr lang="en-US" sz="2400" b="1" dirty="0" smtClean="0">
+                <a:solidFill>
+                  <a:srgbClr val="CCC1DA"/>
+                </a:solidFill>
+                <a:latin typeface="Lucida Console"/>
+                <a:cs typeface="Lucida Console"/>
+              </a:rPr>
+              <a:t>		</a:t>
+            </a:r>
+            <a:r>
+              <a:rPr lang="en-US" sz="2400" b="1" dirty="0" smtClean="0">
                 <a:latin typeface="Lucida Console"/>
                 <a:cs typeface="Lucida Console"/>
               </a:rPr>
@@ -3517,26 +3483,226 @@
               <a:t> </a:t>
             </a:r>
             <a:r>
+              <a:rPr lang="en-US" sz="2400" b="1" dirty="0" smtClean="0">
+                <a:latin typeface="Lucida Console"/>
+                <a:cs typeface="Lucida Console"/>
+              </a:rPr>
+              <a:t>let </a:t>
+            </a:r>
+            <a:r>
+              <a:rPr lang="en-US" sz="2400" dirty="0" smtClean="0">
+                <a:solidFill>
+                  <a:srgbClr val="E6B9B8"/>
+                </a:solidFill>
+                <a:latin typeface="Lucida Console"/>
+                <a:cs typeface="Lucida Console"/>
+              </a:rPr>
+              <a:t>half </a:t>
+            </a:r>
+            <a:r>
+              <a:rPr lang="en-US" sz="2400" dirty="0" smtClean="0">
+                <a:latin typeface="Lucida Console"/>
+                <a:cs typeface="Lucida Console"/>
+              </a:rPr>
+              <a:t>=</a:t>
+            </a:r>
+            <a:r>
+              <a:rPr lang="en-US" sz="2400" dirty="0" smtClean="0">
+                <a:solidFill>
+                  <a:srgbClr val="E6B9B8"/>
+                </a:solidFill>
+                <a:latin typeface="Lucida Console"/>
+                <a:cs typeface="Lucida Console"/>
+              </a:rPr>
+              <a:t> </a:t>
+            </a:r>
+            <a:r>
+              <a:rPr lang="en-US" sz="2400" dirty="0" smtClean="0">
+                <a:solidFill>
+                  <a:srgbClr val="C0504D"/>
+                </a:solidFill>
+                <a:latin typeface="Lucida Console"/>
+                <a:cs typeface="Lucida Console"/>
+              </a:rPr>
+              <a:t>power</a:t>
+            </a:r>
+            <a:r>
+              <a:rPr lang="en-US" sz="2400" dirty="0" smtClean="0">
+                <a:latin typeface="Lucida Console"/>
+                <a:cs typeface="Lucida Console"/>
+              </a:rPr>
+              <a:t> </a:t>
+            </a:r>
+            <a:r>
               <a:rPr lang="en-US" sz="2400" dirty="0">
-                <a:solidFill>
-                  <a:srgbClr val="C0504D"/>
-                </a:solidFill>
-                <a:latin typeface="Lucida Console"/>
-                <a:cs typeface="Lucida Console"/>
-              </a:rPr>
-              <a:t>square</a:t>
+                <a:latin typeface="Lucida Console"/>
+                <a:cs typeface="Lucida Console"/>
+              </a:rPr>
+              <a:t>(</a:t>
             </a:r>
             <a:r>
               <a:rPr lang="en-US" sz="2400" dirty="0">
-                <a:latin typeface="Lucida Console"/>
-                <a:cs typeface="Lucida Console"/>
-              </a:rPr>
-              <a:t> (</a:t>
+                <a:solidFill>
+                  <a:srgbClr val="E6B9B8"/>
+                </a:solidFill>
+                <a:latin typeface="Lucida Console"/>
+                <a:cs typeface="Lucida Console"/>
+              </a:rPr>
+              <a:t>n</a:t>
             </a:r>
             <a:r>
               <a:rPr lang="en-US" sz="2400" dirty="0">
-                <a:solidFill>
-                  <a:srgbClr val="C0504D"/>
+                <a:latin typeface="Lucida Console"/>
+                <a:cs typeface="Lucida Console"/>
+              </a:rPr>
+              <a:t> </a:t>
+            </a:r>
+            <a:r>
+              <a:rPr lang="en-US" sz="2400" dirty="0">
+                <a:solidFill>
+                  <a:schemeClr val="accent2"/>
+                </a:solidFill>
+                <a:latin typeface="Lucida Console"/>
+                <a:cs typeface="Lucida Console"/>
+              </a:rPr>
+              <a:t>`div` </a:t>
+            </a:r>
+            <a:r>
+              <a:rPr lang="en-US" sz="2400" dirty="0">
+                <a:solidFill>
+                  <a:srgbClr val="CCC1DA"/>
+                </a:solidFill>
+                <a:latin typeface="Lucida Console"/>
+                <a:cs typeface="Lucida Console"/>
+              </a:rPr>
+              <a:t>2</a:t>
+            </a:r>
+            <a:r>
+              <a:rPr lang="en-US" sz="2400" dirty="0">
+                <a:latin typeface="Lucida Console"/>
+                <a:cs typeface="Lucida Console"/>
+              </a:rPr>
+              <a:t>) </a:t>
+            </a:r>
+            <a:r>
+              <a:rPr lang="en-US" sz="2400" dirty="0" smtClean="0">
+                <a:solidFill>
+                  <a:srgbClr val="E6B9B8"/>
+                </a:solidFill>
+                <a:latin typeface="Lucida Console"/>
+                <a:cs typeface="Lucida Console"/>
+              </a:rPr>
+              <a:t>x</a:t>
+            </a:r>
+            <a:endParaRPr lang="en-US" sz="2400" dirty="0" smtClean="0">
+              <a:latin typeface="Lucida Console"/>
+              <a:cs typeface="Lucida Console"/>
+            </a:endParaRPr>
+          </a:p>
+          <a:p>
+            <a:r>
+              <a:rPr lang="en-US" sz="2400" dirty="0">
+                <a:latin typeface="Lucida Console"/>
+                <a:cs typeface="Lucida Console"/>
+              </a:rPr>
+              <a:t>	</a:t>
+            </a:r>
+            <a:r>
+              <a:rPr lang="en-US" sz="2400" dirty="0" smtClean="0">
+                <a:latin typeface="Lucida Console"/>
+                <a:cs typeface="Lucida Console"/>
+              </a:rPr>
+              <a:t>				</a:t>
+            </a:r>
+            <a:r>
+              <a:rPr lang="en-US" sz="2400" b="1" dirty="0" smtClean="0">
+                <a:latin typeface="Lucida Console"/>
+                <a:cs typeface="Lucida Console"/>
+              </a:rPr>
+              <a:t>in</a:t>
+            </a:r>
+            <a:r>
+              <a:rPr lang="en-US" sz="2400" dirty="0" smtClean="0">
+                <a:latin typeface="Lucida Console"/>
+                <a:cs typeface="Lucida Console"/>
+              </a:rPr>
+              <a:t> </a:t>
+            </a:r>
+            <a:r>
+              <a:rPr lang="en-US" sz="2400" dirty="0">
+                <a:solidFill>
+                  <a:srgbClr val="E6B9B8"/>
+                </a:solidFill>
+                <a:latin typeface="Lucida Console"/>
+                <a:cs typeface="Lucida Console"/>
+              </a:rPr>
+              <a:t>half </a:t>
+            </a:r>
+            <a:r>
+              <a:rPr lang="en-US" sz="2400" dirty="0" smtClean="0">
+                <a:latin typeface="Lucida Console"/>
+                <a:cs typeface="Lucida Console"/>
+              </a:rPr>
+              <a:t>* </a:t>
+            </a:r>
+            <a:r>
+              <a:rPr lang="en-US" sz="2400" dirty="0" smtClean="0">
+                <a:solidFill>
+                  <a:srgbClr val="E6B9B8"/>
+                </a:solidFill>
+                <a:latin typeface="Lucida Console"/>
+                <a:cs typeface="Lucida Console"/>
+              </a:rPr>
+              <a:t>half</a:t>
+            </a:r>
+            <a:endParaRPr lang="en-US" sz="2400" dirty="0" smtClean="0">
+              <a:latin typeface="Lucida Console"/>
+              <a:cs typeface="Lucida Console"/>
+            </a:endParaRPr>
+          </a:p>
+          <a:p>
+            <a:r>
+              <a:rPr lang="en-US" sz="2400" b="1" dirty="0">
+                <a:latin typeface="Lucida Console"/>
+                <a:cs typeface="Lucida Console"/>
+              </a:rPr>
+              <a:t>	</a:t>
+            </a:r>
+            <a:r>
+              <a:rPr lang="en-US" sz="2400" b="1" dirty="0" smtClean="0">
+                <a:latin typeface="Lucida Console"/>
+                <a:cs typeface="Lucida Console"/>
+              </a:rPr>
+              <a:t>		else</a:t>
+            </a:r>
+            <a:r>
+              <a:rPr lang="en-US" sz="2400" dirty="0" smtClean="0">
+                <a:latin typeface="Lucida Console"/>
+                <a:cs typeface="Lucida Console"/>
+              </a:rPr>
+              <a:t> </a:t>
+            </a:r>
+            <a:r>
+              <a:rPr lang="en-US" sz="2400" dirty="0">
+                <a:solidFill>
+                  <a:srgbClr val="E6B9B8"/>
+                </a:solidFill>
+                <a:latin typeface="Lucida Console"/>
+                <a:cs typeface="Lucida Console"/>
+              </a:rPr>
+              <a:t>x</a:t>
+            </a:r>
+            <a:r>
+              <a:rPr lang="en-US" sz="2400" dirty="0">
+                <a:latin typeface="Lucida Console"/>
+                <a:cs typeface="Lucida Console"/>
+              </a:rPr>
+              <a:t> * </a:t>
+            </a:r>
+            <a:r>
+              <a:rPr lang="en-US" sz="2400" dirty="0" smtClean="0">
+                <a:solidFill>
+                  <a:schemeClr val="accent2"/>
                 </a:solidFill>
                 <a:latin typeface="Lucida Console"/>
                 <a:cs typeface="Lucida Console"/>
@@ -3544,194 +3710,69 @@
               <a:t>power</a:t>
             </a:r>
             <a:r>
+              <a:rPr lang="en-US" sz="2400" dirty="0" smtClean="0">
+                <a:latin typeface="Lucida Console"/>
+                <a:cs typeface="Lucida Console"/>
+              </a:rPr>
+              <a:t> </a:t>
+            </a:r>
+            <a:r>
               <a:rPr lang="en-US" sz="2400" dirty="0">
                 <a:latin typeface="Lucida Console"/>
                 <a:cs typeface="Lucida Console"/>
               </a:rPr>
+              <a:t>(</a:t>
+            </a:r>
+            <a:r>
+              <a:rPr lang="en-US" sz="2400" dirty="0">
+                <a:solidFill>
+                  <a:srgbClr val="E6B9B8"/>
+                </a:solidFill>
+                <a:latin typeface="Lucida Console"/>
+                <a:cs typeface="Lucida Console"/>
+              </a:rPr>
+              <a:t>n</a:t>
+            </a:r>
+            <a:r>
+              <a:rPr lang="en-US" sz="2400" dirty="0">
+                <a:latin typeface="Lucida Console"/>
+                <a:cs typeface="Lucida Console"/>
+              </a:rPr>
               <a:t> </a:t>
             </a:r>
             <a:r>
+              <a:rPr lang="en-US" sz="2400" dirty="0" smtClean="0">
+                <a:latin typeface="Lucida Console"/>
+                <a:cs typeface="Lucida Console"/>
+              </a:rPr>
+              <a:t>– </a:t>
+            </a:r>
+            <a:r>
               <a:rPr lang="en-US" sz="2400" dirty="0">
                 <a:solidFill>
+                  <a:srgbClr val="CCC1DA"/>
+                </a:solidFill>
+                <a:latin typeface="Lucida Console"/>
+                <a:cs typeface="Lucida Console"/>
+              </a:rPr>
+              <a:t>1</a:t>
+            </a:r>
+            <a:r>
+              <a:rPr lang="en-US" sz="2400" dirty="0" smtClean="0">
+                <a:latin typeface="Lucida Console"/>
+                <a:cs typeface="Lucida Console"/>
+              </a:rPr>
+              <a:t>) </a:t>
+            </a:r>
+            <a:r>
+              <a:rPr lang="en-US" sz="2400" dirty="0">
+                <a:solidFill>
                   <a:srgbClr val="E6B9B8"/>
                 </a:solidFill>
                 <a:latin typeface="Lucida Console"/>
                 <a:cs typeface="Lucida Console"/>
               </a:rPr>
               <a:t>x</a:t>
-            </a:r>
-            <a:r>
-              <a:rPr lang="en-US" sz="2400" dirty="0">
-                <a:latin typeface="Lucida Console"/>
-                <a:cs typeface="Lucida Console"/>
-              </a:rPr>
-              <a:t> (</a:t>
-            </a:r>
-            <a:r>
-              <a:rPr lang="en-US" sz="2400" dirty="0">
-                <a:solidFill>
-                  <a:srgbClr val="E6B9B8"/>
-                </a:solidFill>
-                <a:latin typeface="Lucida Console"/>
-                <a:cs typeface="Lucida Console"/>
-              </a:rPr>
-              <a:t>n</a:t>
-            </a:r>
-            <a:r>
-              <a:rPr lang="en-US" sz="2400" dirty="0">
-                <a:latin typeface="Lucida Console"/>
-                <a:cs typeface="Lucida Console"/>
-              </a:rPr>
-              <a:t> </a:t>
-            </a:r>
-            <a:r>
-              <a:rPr lang="en-US" sz="2400" dirty="0">
-                <a:solidFill>
-                  <a:schemeClr val="accent2"/>
-                </a:solidFill>
-                <a:latin typeface="Lucida Console"/>
-                <a:cs typeface="Lucida Console"/>
-              </a:rPr>
-              <a:t>`div` </a:t>
-            </a:r>
-            <a:r>
-              <a:rPr lang="en-US" sz="2400" dirty="0">
-                <a:solidFill>
-                  <a:srgbClr val="CCC1DA"/>
-                </a:solidFill>
-                <a:latin typeface="Lucida Console"/>
-                <a:cs typeface="Lucida Console"/>
-              </a:rPr>
-              <a:t>2</a:t>
-            </a:r>
-            <a:r>
-              <a:rPr lang="en-US" sz="2400" dirty="0">
-                <a:latin typeface="Lucida Console"/>
-                <a:cs typeface="Lucida Console"/>
-              </a:rPr>
-              <a:t>)</a:t>
-            </a:r>
-            <a:r>
-              <a:rPr lang="en-US" sz="2400" dirty="0" smtClean="0">
-                <a:latin typeface="Lucida Console"/>
-                <a:cs typeface="Lucida Console"/>
-              </a:rPr>
-              <a:t>)</a:t>
-            </a:r>
-          </a:p>
-          <a:p>
-            <a:r>
-              <a:rPr lang="en-US" sz="2400" b="1" dirty="0">
-                <a:latin typeface="Lucida Console"/>
-                <a:cs typeface="Lucida Console"/>
-              </a:rPr>
-              <a:t>	</a:t>
-            </a:r>
-            <a:r>
-              <a:rPr lang="en-US" sz="2400" b="1" dirty="0" smtClean="0">
-                <a:latin typeface="Lucida Console"/>
-                <a:cs typeface="Lucida Console"/>
-              </a:rPr>
-              <a:t>else</a:t>
-            </a:r>
-            <a:r>
-              <a:rPr lang="en-US" sz="2400" dirty="0" smtClean="0">
-                <a:latin typeface="Lucida Console"/>
-                <a:cs typeface="Lucida Console"/>
-              </a:rPr>
-              <a:t> </a:t>
-            </a:r>
-            <a:r>
-              <a:rPr lang="en-US" sz="2400" dirty="0">
-                <a:solidFill>
-                  <a:srgbClr val="E6B9B8"/>
-                </a:solidFill>
-                <a:latin typeface="Lucida Console"/>
-                <a:cs typeface="Lucida Console"/>
-              </a:rPr>
-              <a:t>x</a:t>
-            </a:r>
-            <a:r>
-              <a:rPr lang="en-US" sz="2400" dirty="0">
-                <a:latin typeface="Lucida Console"/>
-                <a:cs typeface="Lucida Console"/>
-              </a:rPr>
-              <a:t> * </a:t>
-            </a:r>
-            <a:r>
-              <a:rPr lang="en-US" sz="2400" dirty="0">
-                <a:solidFill>
-                  <a:schemeClr val="accent2"/>
-                </a:solidFill>
-                <a:latin typeface="Lucida Console"/>
-                <a:cs typeface="Lucida Console"/>
-              </a:rPr>
-              <a:t>power</a:t>
-            </a:r>
-            <a:r>
-              <a:rPr lang="en-US" sz="2400" dirty="0">
-                <a:latin typeface="Lucida Console"/>
-                <a:cs typeface="Lucida Console"/>
-              </a:rPr>
-              <a:t> </a:t>
-            </a:r>
-            <a:r>
-              <a:rPr lang="en-US" sz="2400" dirty="0">
-                <a:solidFill>
-                  <a:srgbClr val="E6B9B8"/>
-                </a:solidFill>
-                <a:latin typeface="Lucida Console"/>
-                <a:cs typeface="Lucida Console"/>
-              </a:rPr>
-              <a:t>x</a:t>
-            </a:r>
-            <a:r>
-              <a:rPr lang="en-US" sz="2400" dirty="0">
-                <a:latin typeface="Lucida Console"/>
-                <a:cs typeface="Lucida Console"/>
-              </a:rPr>
-              <a:t> (</a:t>
-            </a:r>
-            <a:r>
-              <a:rPr lang="en-US" sz="2400" dirty="0">
-                <a:solidFill>
-                  <a:srgbClr val="E6B9B8"/>
-                </a:solidFill>
-                <a:latin typeface="Lucida Console"/>
-                <a:cs typeface="Lucida Console"/>
-              </a:rPr>
-              <a:t>n</a:t>
-            </a:r>
-            <a:r>
-              <a:rPr lang="en-US" sz="2400" dirty="0">
-                <a:latin typeface="Lucida Console"/>
-                <a:cs typeface="Lucida Console"/>
-              </a:rPr>
-              <a:t> </a:t>
-            </a:r>
-            <a:r>
-              <a:rPr lang="en-US" sz="2400" dirty="0" smtClean="0">
-                <a:latin typeface="Lucida Console"/>
-                <a:cs typeface="Lucida Console"/>
-              </a:rPr>
-              <a:t>– </a:t>
-            </a:r>
-            <a:r>
-              <a:rPr lang="en-US" sz="2400" dirty="0">
-                <a:solidFill>
-                  <a:srgbClr val="CCC1DA"/>
-                </a:solidFill>
-                <a:latin typeface="Lucida Console"/>
-                <a:cs typeface="Lucida Console"/>
-              </a:rPr>
-              <a:t>1</a:t>
-            </a:r>
-            <a:r>
-              <a:rPr lang="en-US" sz="2400" dirty="0" smtClean="0">
-                <a:latin typeface="Lucida Console"/>
-                <a:cs typeface="Lucida Console"/>
-              </a:rPr>
-              <a:t>)</a:t>
             </a:r>
             <a:endParaRPr lang="en-US" sz="2400" dirty="0">
               <a:latin typeface="Lucida Console"/>

</xml_diff>